<commit_message>
change news to notice
</commit_message>
<xml_diff>
--- a/docs/menu_tree/menu_tree_v3_20200903.pptx
+++ b/docs/menu_tree/menu_tree_v3_20200903.pptx
@@ -4509,7 +4509,7 @@
           <p:cNvPr id="13" name="연결선: 꺾임 12">
             <a:extLst>
               <a:ext uri="{FF2B5EF4-FFF2-40B4-BE49-F238E27FC236}">
-                <a16:creationId xmlns="" xmlns:a16="http://schemas.microsoft.com/office/drawing/2014/main" id="{FE2416BC-F955-479E-B7EC-9E9AD13899B2}"/>
+                <a16:creationId xmlns:a16="http://schemas.microsoft.com/office/drawing/2014/main" xmlns="" id="{FE2416BC-F955-479E-B7EC-9E9AD13899B2}"/>
               </a:ext>
             </a:extLst>
           </p:cNvPr>
@@ -4555,7 +4555,7 @@
           <p:cNvPr id="68" name="직선 연결선 67">
             <a:extLst>
               <a:ext uri="{FF2B5EF4-FFF2-40B4-BE49-F238E27FC236}">
-                <a16:creationId xmlns="" xmlns:a16="http://schemas.microsoft.com/office/drawing/2014/main" id="{B4F53153-C709-4C74-BEFB-F3546F948345}"/>
+                <a16:creationId xmlns:a16="http://schemas.microsoft.com/office/drawing/2014/main" xmlns="" id="{B4F53153-C709-4C74-BEFB-F3546F948345}"/>
               </a:ext>
             </a:extLst>
           </p:cNvPr>
@@ -4598,7 +4598,7 @@
           <p:cNvPr id="71" name="직선 연결선 70">
             <a:extLst>
               <a:ext uri="{FF2B5EF4-FFF2-40B4-BE49-F238E27FC236}">
-                <a16:creationId xmlns="" xmlns:a16="http://schemas.microsoft.com/office/drawing/2014/main" id="{5EED6E64-F115-454E-8906-3788DFA6ACCF}"/>
+                <a16:creationId xmlns:a16="http://schemas.microsoft.com/office/drawing/2014/main" xmlns="" id="{5EED6E64-F115-454E-8906-3788DFA6ACCF}"/>
               </a:ext>
             </a:extLst>
           </p:cNvPr>

</xml_diff>